<commit_message>
updated to use elevenlabs
</commit_message>
<xml_diff>
--- a/PowerPoint2Video Tutorial.pptx
+++ b/PowerPoint2Video Tutorial.pptx
@@ -5,15 +5,16 @@
     <p:sldMasterId id="2147483648" r:id="rId1"/>
   </p:sldMasterIdLst>
   <p:notesMasterIdLst>
-    <p:notesMasterId r:id="rId8"/>
+    <p:notesMasterId r:id="rId9"/>
   </p:notesMasterIdLst>
   <p:sldIdLst>
     <p:sldId id="256" r:id="rId2"/>
     <p:sldId id="262" r:id="rId3"/>
     <p:sldId id="258" r:id="rId4"/>
     <p:sldId id="259" r:id="rId5"/>
-    <p:sldId id="260" r:id="rId6"/>
-    <p:sldId id="261" r:id="rId7"/>
+    <p:sldId id="263" r:id="rId6"/>
+    <p:sldId id="260" r:id="rId7"/>
+    <p:sldId id="261" r:id="rId8"/>
   </p:sldIdLst>
   <p:sldSz cx="12192000" cy="6858000"/>
   <p:notesSz cx="6858000" cy="9144000"/>
@@ -202,7 +203,7 @@
           <a:p>
             <a:fld id="{2E1F56A2-3178-4782-B2EE-2EC55770787F}" type="datetimeFigureOut">
               <a:rPr lang="en-AU" smtClean="0"/>
-              <a:t>6/03/2025</a:t>
+              <a:t>10/03/2025</a:t>
             </a:fld>
             <a:endParaRPr lang="en-AU"/>
           </a:p>
@@ -878,6 +879,125 @@
         <p:cNvPr id="1" name="">
           <a:extLst>
             <a:ext uri="{FF2B5EF4-FFF2-40B4-BE49-F238E27FC236}">
+              <a16:creationId xmlns:a16="http://schemas.microsoft.com/office/drawing/2014/main" id="{74C8EE06-EA68-3D63-B879-B5D65B5AC00B}"/>
+            </a:ext>
+          </a:extLst>
+        </p:cNvPr>
+        <p:cNvGrpSpPr/>
+        <p:nvPr/>
+      </p:nvGrpSpPr>
+      <p:grpSpPr>
+        <a:xfrm>
+          <a:off x="0" y="0"/>
+          <a:ext cx="0" cy="0"/>
+          <a:chOff x="0" y="0"/>
+          <a:chExt cx="0" cy="0"/>
+        </a:xfrm>
+      </p:grpSpPr>
+      <p:sp>
+        <p:nvSpPr>
+          <p:cNvPr id="2" name="Slide Image Placeholder 1">
+            <a:extLst>
+              <a:ext uri="{FF2B5EF4-FFF2-40B4-BE49-F238E27FC236}">
+                <a16:creationId xmlns:a16="http://schemas.microsoft.com/office/drawing/2014/main" id="{A9A251CC-2B0D-E57B-33DF-3BBC6A716B49}"/>
+              </a:ext>
+            </a:extLst>
+          </p:cNvPr>
+          <p:cNvSpPr>
+            <a:spLocks noGrp="1" noRot="1" noChangeAspect="1"/>
+          </p:cNvSpPr>
+          <p:nvPr>
+            <p:ph type="sldImg"/>
+          </p:nvPr>
+        </p:nvSpPr>
+        <p:spPr/>
+      </p:sp>
+      <p:sp>
+        <p:nvSpPr>
+          <p:cNvPr id="3" name="Notes Placeholder 2">
+            <a:extLst>
+              <a:ext uri="{FF2B5EF4-FFF2-40B4-BE49-F238E27FC236}">
+                <a16:creationId xmlns:a16="http://schemas.microsoft.com/office/drawing/2014/main" id="{8E0BC218-8771-703D-5EFF-F21612EC4B77}"/>
+              </a:ext>
+            </a:extLst>
+          </p:cNvPr>
+          <p:cNvSpPr>
+            <a:spLocks noGrp="1"/>
+          </p:cNvSpPr>
+          <p:nvPr>
+            <p:ph type="body" idx="1"/>
+          </p:nvPr>
+        </p:nvSpPr>
+        <p:spPr/>
+        <p:txBody>
+          <a:bodyPr/>
+          <a:lstStyle/>
+          <a:p>
+            <a:r>
+              <a:rPr lang="en-AU" dirty="0"/>
+              <a:t>The converter features </a:t>
+            </a:r>
+            <a:r>
+              <a:rPr lang="en-AU"/>
+              <a:t>a dictionary </a:t>
+            </a:r>
+            <a:r>
+              <a:rPr lang="en-AU" dirty="0"/>
+              <a:t>which allows you to program custom conversions.  This allows you to control how key words are spoken.  For example, TwinCAT, EtherCAT, and 4024 will be converted to their preferred pronunciation.  This keeps your PowerPoint scripts decluttered.  </a:t>
+            </a:r>
+          </a:p>
+        </p:txBody>
+      </p:sp>
+      <p:sp>
+        <p:nvSpPr>
+          <p:cNvPr id="4" name="Slide Number Placeholder 3">
+            <a:extLst>
+              <a:ext uri="{FF2B5EF4-FFF2-40B4-BE49-F238E27FC236}">
+                <a16:creationId xmlns:a16="http://schemas.microsoft.com/office/drawing/2014/main" id="{1E677E37-9744-8D12-E3CC-F318B22C0223}"/>
+              </a:ext>
+            </a:extLst>
+          </p:cNvPr>
+          <p:cNvSpPr>
+            <a:spLocks noGrp="1"/>
+          </p:cNvSpPr>
+          <p:nvPr>
+            <p:ph type="sldNum" sz="quarter" idx="5"/>
+          </p:nvPr>
+        </p:nvSpPr>
+        <p:spPr/>
+        <p:txBody>
+          <a:bodyPr/>
+          <a:lstStyle/>
+          <a:p>
+            <a:fld id="{B4010C41-C78F-4783-B6C1-D57FD2F0A8BA}" type="slidenum">
+              <a:rPr lang="en-AU" smtClean="0"/>
+              <a:t>5</a:t>
+            </a:fld>
+            <a:endParaRPr lang="en-AU"/>
+          </a:p>
+        </p:txBody>
+      </p:sp>
+    </p:spTree>
+    <p:extLst>
+      <p:ext uri="{BB962C8B-B14F-4D97-AF65-F5344CB8AC3E}">
+        <p14:creationId xmlns:p14="http://schemas.microsoft.com/office/powerpoint/2010/main" val="1803562548"/>
+      </p:ext>
+    </p:extLst>
+  </p:cSld>
+  <p:clrMapOvr>
+    <a:masterClrMapping/>
+  </p:clrMapOvr>
+</p:notes>
+</file>
+
+<file path=ppt/notesSlides/notesSlide6.xml><?xml version="1.0" encoding="utf-8"?>
+<p:notes xmlns:a="http://schemas.openxmlformats.org/drawingml/2006/main" xmlns:r="http://schemas.openxmlformats.org/officeDocument/2006/relationships" xmlns:p="http://schemas.openxmlformats.org/presentationml/2006/main">
+  <p:cSld>
+    <p:spTree>
+      <p:nvGrpSpPr>
+        <p:cNvPr id="1" name="">
+          <a:extLst>
+            <a:ext uri="{FF2B5EF4-FFF2-40B4-BE49-F238E27FC236}">
               <a16:creationId xmlns:a16="http://schemas.microsoft.com/office/drawing/2014/main" id="{DAF57605-4523-16F1-7376-AB2A814ECF34}"/>
             </a:ext>
           </a:extLst>
@@ -996,7 +1116,7 @@
           <a:p>
             <a:fld id="{B4010C41-C78F-4783-B6C1-D57FD2F0A8BA}" type="slidenum">
               <a:rPr lang="en-AU" smtClean="0"/>
-              <a:t>5</a:t>
+              <a:t>6</a:t>
             </a:fld>
             <a:endParaRPr lang="en-AU"/>
           </a:p>
@@ -1015,7 +1135,7 @@
 </p:notes>
 </file>
 
-<file path=ppt/notesSlides/notesSlide6.xml><?xml version="1.0" encoding="utf-8"?>
+<file path=ppt/notesSlides/notesSlide7.xml><?xml version="1.0" encoding="utf-8"?>
 <p:notes xmlns:a="http://schemas.openxmlformats.org/drawingml/2006/main" xmlns:r="http://schemas.openxmlformats.org/officeDocument/2006/relationships" xmlns:p="http://schemas.openxmlformats.org/presentationml/2006/main">
   <p:cSld>
     <p:spTree>
@@ -1125,7 +1245,7 @@
           <a:p>
             <a:fld id="{B4010C41-C78F-4783-B6C1-D57FD2F0A8BA}" type="slidenum">
               <a:rPr lang="en-AU" smtClean="0"/>
-              <a:t>6</a:t>
+              <a:t>7</a:t>
             </a:fld>
             <a:endParaRPr lang="en-AU"/>
           </a:p>
@@ -1293,7 +1413,7 @@
           <a:p>
             <a:fld id="{66FE9D8B-FE65-4D70-813C-B0C2953C31EE}" type="datetimeFigureOut">
               <a:rPr lang="en-AU" smtClean="0"/>
-              <a:t>6/03/2025</a:t>
+              <a:t>10/03/2025</a:t>
             </a:fld>
             <a:endParaRPr lang="en-AU"/>
           </a:p>
@@ -1493,7 +1613,7 @@
           <a:p>
             <a:fld id="{66FE9D8B-FE65-4D70-813C-B0C2953C31EE}" type="datetimeFigureOut">
               <a:rPr lang="en-AU" smtClean="0"/>
-              <a:t>6/03/2025</a:t>
+              <a:t>10/03/2025</a:t>
             </a:fld>
             <a:endParaRPr lang="en-AU"/>
           </a:p>
@@ -1703,7 +1823,7 @@
           <a:p>
             <a:fld id="{66FE9D8B-FE65-4D70-813C-B0C2953C31EE}" type="datetimeFigureOut">
               <a:rPr lang="en-AU" smtClean="0"/>
-              <a:t>6/03/2025</a:t>
+              <a:t>10/03/2025</a:t>
             </a:fld>
             <a:endParaRPr lang="en-AU"/>
           </a:p>
@@ -1903,7 +2023,7 @@
           <a:p>
             <a:fld id="{66FE9D8B-FE65-4D70-813C-B0C2953C31EE}" type="datetimeFigureOut">
               <a:rPr lang="en-AU" smtClean="0"/>
-              <a:t>6/03/2025</a:t>
+              <a:t>10/03/2025</a:t>
             </a:fld>
             <a:endParaRPr lang="en-AU"/>
           </a:p>
@@ -2179,7 +2299,7 @@
           <a:p>
             <a:fld id="{66FE9D8B-FE65-4D70-813C-B0C2953C31EE}" type="datetimeFigureOut">
               <a:rPr lang="en-AU" smtClean="0"/>
-              <a:t>6/03/2025</a:t>
+              <a:t>10/03/2025</a:t>
             </a:fld>
             <a:endParaRPr lang="en-AU"/>
           </a:p>
@@ -2447,7 +2567,7 @@
           <a:p>
             <a:fld id="{66FE9D8B-FE65-4D70-813C-B0C2953C31EE}" type="datetimeFigureOut">
               <a:rPr lang="en-AU" smtClean="0"/>
-              <a:t>6/03/2025</a:t>
+              <a:t>10/03/2025</a:t>
             </a:fld>
             <a:endParaRPr lang="en-AU"/>
           </a:p>
@@ -2862,7 +2982,7 @@
           <a:p>
             <a:fld id="{66FE9D8B-FE65-4D70-813C-B0C2953C31EE}" type="datetimeFigureOut">
               <a:rPr lang="en-AU" smtClean="0"/>
-              <a:t>6/03/2025</a:t>
+              <a:t>10/03/2025</a:t>
             </a:fld>
             <a:endParaRPr lang="en-AU"/>
           </a:p>
@@ -3004,7 +3124,7 @@
           <a:p>
             <a:fld id="{66FE9D8B-FE65-4D70-813C-B0C2953C31EE}" type="datetimeFigureOut">
               <a:rPr lang="en-AU" smtClean="0"/>
-              <a:t>6/03/2025</a:t>
+              <a:t>10/03/2025</a:t>
             </a:fld>
             <a:endParaRPr lang="en-AU"/>
           </a:p>
@@ -3117,7 +3237,7 @@
           <a:p>
             <a:fld id="{66FE9D8B-FE65-4D70-813C-B0C2953C31EE}" type="datetimeFigureOut">
               <a:rPr lang="en-AU" smtClean="0"/>
-              <a:t>6/03/2025</a:t>
+              <a:t>10/03/2025</a:t>
             </a:fld>
             <a:endParaRPr lang="en-AU"/>
           </a:p>
@@ -3430,7 +3550,7 @@
           <a:p>
             <a:fld id="{66FE9D8B-FE65-4D70-813C-B0C2953C31EE}" type="datetimeFigureOut">
               <a:rPr lang="en-AU" smtClean="0"/>
-              <a:t>6/03/2025</a:t>
+              <a:t>10/03/2025</a:t>
             </a:fld>
             <a:endParaRPr lang="en-AU"/>
           </a:p>
@@ -3719,7 +3839,7 @@
           <a:p>
             <a:fld id="{66FE9D8B-FE65-4D70-813C-B0C2953C31EE}" type="datetimeFigureOut">
               <a:rPr lang="en-AU" smtClean="0"/>
-              <a:t>6/03/2025</a:t>
+              <a:t>10/03/2025</a:t>
             </a:fld>
             <a:endParaRPr lang="en-AU"/>
           </a:p>
@@ -3962,7 +4082,7 @@
           <a:p>
             <a:fld id="{66FE9D8B-FE65-4D70-813C-B0C2953C31EE}" type="datetimeFigureOut">
               <a:rPr lang="en-AU" smtClean="0"/>
-              <a:t>6/03/2025</a:t>
+              <a:t>10/03/2025</a:t>
             </a:fld>
             <a:endParaRPr lang="en-AU"/>
           </a:p>
@@ -5299,6 +5419,125 @@
         <p:cNvPr id="1" name="">
           <a:extLst>
             <a:ext uri="{FF2B5EF4-FFF2-40B4-BE49-F238E27FC236}">
+              <a16:creationId xmlns:a16="http://schemas.microsoft.com/office/drawing/2014/main" id="{3389246D-C1CD-9289-D7F3-00207688FD61}"/>
+            </a:ext>
+          </a:extLst>
+        </p:cNvPr>
+        <p:cNvGrpSpPr/>
+        <p:nvPr/>
+      </p:nvGrpSpPr>
+      <p:grpSpPr>
+        <a:xfrm>
+          <a:off x="0" y="0"/>
+          <a:ext cx="0" cy="0"/>
+          <a:chOff x="0" y="0"/>
+          <a:chExt cx="0" cy="0"/>
+        </a:xfrm>
+      </p:grpSpPr>
+      <p:sp>
+        <p:nvSpPr>
+          <p:cNvPr id="2" name="Title 1">
+            <a:extLst>
+              <a:ext uri="{FF2B5EF4-FFF2-40B4-BE49-F238E27FC236}">
+                <a16:creationId xmlns:a16="http://schemas.microsoft.com/office/drawing/2014/main" id="{D9B9C672-E7D8-691A-DC65-46464A9A2D0A}"/>
+              </a:ext>
+            </a:extLst>
+          </p:cNvPr>
+          <p:cNvSpPr>
+            <a:spLocks noGrp="1"/>
+          </p:cNvSpPr>
+          <p:nvPr>
+            <p:ph type="ctrTitle"/>
+          </p:nvPr>
+        </p:nvSpPr>
+        <p:spPr/>
+        <p:txBody>
+          <a:bodyPr/>
+          <a:lstStyle/>
+          <a:p>
+            <a:r>
+              <a:rPr lang="en-AU" dirty="0"/>
+              <a:t>Custom Library Support</a:t>
+            </a:r>
+          </a:p>
+        </p:txBody>
+      </p:sp>
+      <p:sp>
+        <p:nvSpPr>
+          <p:cNvPr id="3" name="Subtitle 2">
+            <a:extLst>
+              <a:ext uri="{FF2B5EF4-FFF2-40B4-BE49-F238E27FC236}">
+                <a16:creationId xmlns:a16="http://schemas.microsoft.com/office/drawing/2014/main" id="{79BA4F91-2E9B-9EE9-F03C-80A26D532A9B}"/>
+              </a:ext>
+            </a:extLst>
+          </p:cNvPr>
+          <p:cNvSpPr>
+            <a:spLocks noGrp="1"/>
+          </p:cNvSpPr>
+          <p:nvPr>
+            <p:ph type="subTitle" idx="1"/>
+          </p:nvPr>
+        </p:nvSpPr>
+        <p:spPr/>
+        <p:txBody>
+          <a:bodyPr>
+            <a:normAutofit lnSpcReduction="10000"/>
+          </a:bodyPr>
+          <a:lstStyle/>
+          <a:p>
+            <a:r>
+              <a:rPr lang="en-AU" dirty="0"/>
+              <a:t>The converter features a </a:t>
+            </a:r>
+            <a:r>
+              <a:rPr lang="en-AU" dirty="0" err="1"/>
+              <a:t>dictionary.json</a:t>
+            </a:r>
+            <a:r>
+              <a:rPr lang="en-AU" dirty="0"/>
+              <a:t> which allows you to program custom conversions. </a:t>
+            </a:r>
+            <a:br>
+              <a:rPr lang="en-AU" dirty="0"/>
+            </a:br>
+            <a:br>
+              <a:rPr lang="en-AU" dirty="0"/>
+            </a:br>
+            <a:r>
+              <a:rPr lang="en-AU" dirty="0"/>
+              <a:t>TwinCAT = “twin-cat”</a:t>
+            </a:r>
+            <a:br>
+              <a:rPr lang="en-AU" dirty="0"/>
+            </a:br>
+            <a:r>
+              <a:rPr lang="en-AU" dirty="0"/>
+              <a:t>4024 = “40 24”</a:t>
+            </a:r>
+          </a:p>
+        </p:txBody>
+      </p:sp>
+    </p:spTree>
+    <p:extLst>
+      <p:ext uri="{BB962C8B-B14F-4D97-AF65-F5344CB8AC3E}">
+        <p14:creationId xmlns:p14="http://schemas.microsoft.com/office/powerpoint/2010/main" val="3849956154"/>
+      </p:ext>
+    </p:extLst>
+  </p:cSld>
+  <p:clrMapOvr>
+    <a:masterClrMapping/>
+  </p:clrMapOvr>
+</p:sld>
+</file>
+
+<file path=ppt/slides/slide6.xml><?xml version="1.0" encoding="utf-8"?>
+<p:sld xmlns:a="http://schemas.openxmlformats.org/drawingml/2006/main" xmlns:r="http://schemas.openxmlformats.org/officeDocument/2006/relationships" xmlns:p="http://schemas.openxmlformats.org/presentationml/2006/main">
+  <p:cSld>
+    <p:spTree>
+      <p:nvGrpSpPr>
+        <p:cNvPr id="1" name="">
+          <a:extLst>
+            <a:ext uri="{FF2B5EF4-FFF2-40B4-BE49-F238E27FC236}">
               <a16:creationId xmlns:a16="http://schemas.microsoft.com/office/drawing/2014/main" id="{CD5AA433-87E2-097C-7DB9-31B57EC39AEB}"/>
             </a:ext>
           </a:extLst>
@@ -5416,7 +5655,7 @@
 </p:sld>
 </file>
 
-<file path=ppt/slides/slide6.xml><?xml version="1.0" encoding="utf-8"?>
+<file path=ppt/slides/slide7.xml><?xml version="1.0" encoding="utf-8"?>
 <p:sld xmlns:a="http://schemas.openxmlformats.org/drawingml/2006/main" xmlns:r="http://schemas.openxmlformats.org/officeDocument/2006/relationships" xmlns:p="http://schemas.openxmlformats.org/presentationml/2006/main">
   <p:cSld>
     <p:spTree>

</xml_diff>